<commit_message>
la til all koden for serial kommunikasjon mellom arduinoen og nodemcuen
</commit_message>
<xml_diff>
--- a/Høytaler/koblingsskjema.pptx
+++ b/Høytaler/koblingsskjema.pptx
@@ -4197,6 +4197,102 @@
             <pc:docMk/>
             <pc:sldMk cId="3208764681" sldId="257"/>
             <ac:cxnSpMk id="882" creationId="{43F751C3-AE7F-48FD-BF19-D70B6C9EA351}"/>
+          </ac:cxnSpMkLst>
+        </pc:cxnChg>
+      </pc:sldChg>
+    </pc:docChg>
+  </pc:docChgLst>
+  <pc:docChgLst>
+    <pc:chgData name="Åsmund Runningen" userId="fcfce1d5-2d35-4b5c-86f4-e24bd46c268e" providerId="ADAL" clId="{939B8C75-5EAA-43CB-989D-A0CCA3F7B510}"/>
+    <pc:docChg chg="custSel modSld">
+      <pc:chgData name="Åsmund Runningen" userId="fcfce1d5-2d35-4b5c-86f4-e24bd46c268e" providerId="ADAL" clId="{939B8C75-5EAA-43CB-989D-A0CCA3F7B510}" dt="2019-03-30T19:06:41.359" v="10" actId="14100"/>
+      <pc:docMkLst>
+        <pc:docMk/>
+      </pc:docMkLst>
+      <pc:sldChg chg="delSp modSp">
+        <pc:chgData name="Åsmund Runningen" userId="fcfce1d5-2d35-4b5c-86f4-e24bd46c268e" providerId="ADAL" clId="{939B8C75-5EAA-43CB-989D-A0CCA3F7B510}" dt="2019-03-30T19:06:41.359" v="10" actId="14100"/>
+        <pc:sldMkLst>
+          <pc:docMk/>
+          <pc:sldMk cId="3208764681" sldId="257"/>
+        </pc:sldMkLst>
+        <pc:spChg chg="del">
+          <ac:chgData name="Åsmund Runningen" userId="fcfce1d5-2d35-4b5c-86f4-e24bd46c268e" providerId="ADAL" clId="{939B8C75-5EAA-43CB-989D-A0CCA3F7B510}" dt="2019-03-30T19:06:07.180" v="0" actId="478"/>
+          <ac:spMkLst>
+            <pc:docMk/>
+            <pc:sldMk cId="3208764681" sldId="257"/>
+            <ac:spMk id="14" creationId="{38E9B4EB-784B-4E31-BBB4-3F8A8A589673}"/>
+          </ac:spMkLst>
+        </pc:spChg>
+        <pc:grpChg chg="del">
+          <ac:chgData name="Åsmund Runningen" userId="fcfce1d5-2d35-4b5c-86f4-e24bd46c268e" providerId="ADAL" clId="{939B8C75-5EAA-43CB-989D-A0CCA3F7B510}" dt="2019-03-30T19:06:11.004" v="2" actId="478"/>
+          <ac:grpSpMkLst>
+            <pc:docMk/>
+            <pc:sldMk cId="3208764681" sldId="257"/>
+            <ac:grpSpMk id="100" creationId="{1CD3C71F-23C1-4ED0-A9A9-962B7F526E18}"/>
+          </ac:grpSpMkLst>
+        </pc:grpChg>
+        <pc:grpChg chg="del">
+          <ac:chgData name="Åsmund Runningen" userId="fcfce1d5-2d35-4b5c-86f4-e24bd46c268e" providerId="ADAL" clId="{939B8C75-5EAA-43CB-989D-A0CCA3F7B510}" dt="2019-03-30T19:06:08.747" v="1" actId="478"/>
+          <ac:grpSpMkLst>
+            <pc:docMk/>
+            <pc:sldMk cId="3208764681" sldId="257"/>
+            <ac:grpSpMk id="415" creationId="{AA2BB301-ADAF-4C4C-A8B8-0E146D25B086}"/>
+          </ac:grpSpMkLst>
+        </pc:grpChg>
+        <pc:grpChg chg="del">
+          <ac:chgData name="Åsmund Runningen" userId="fcfce1d5-2d35-4b5c-86f4-e24bd46c268e" providerId="ADAL" clId="{939B8C75-5EAA-43CB-989D-A0CCA3F7B510}" dt="2019-03-30T19:06:13.394" v="3" actId="478"/>
+          <ac:grpSpMkLst>
+            <pc:docMk/>
+            <pc:sldMk cId="3208764681" sldId="257"/>
+            <ac:grpSpMk id="457" creationId="{002A2DAA-0DF2-41B3-8E65-4E8FAFD0AFA7}"/>
+          </ac:grpSpMkLst>
+        </pc:grpChg>
+        <pc:cxnChg chg="del">
+          <ac:chgData name="Åsmund Runningen" userId="fcfce1d5-2d35-4b5c-86f4-e24bd46c268e" providerId="ADAL" clId="{939B8C75-5EAA-43CB-989D-A0CCA3F7B510}" dt="2019-03-30T19:06:19.006" v="5" actId="478"/>
+          <ac:cxnSpMkLst>
+            <pc:docMk/>
+            <pc:sldMk cId="3208764681" sldId="257"/>
+            <ac:cxnSpMk id="433" creationId="{6DF8B82F-FD0A-4B73-8EDC-51E135FC9E65}"/>
+          </ac:cxnSpMkLst>
+        </pc:cxnChg>
+        <pc:cxnChg chg="mod">
+          <ac:chgData name="Åsmund Runningen" userId="fcfce1d5-2d35-4b5c-86f4-e24bd46c268e" providerId="ADAL" clId="{939B8C75-5EAA-43CB-989D-A0CCA3F7B510}" dt="2019-03-30T19:06:41.359" v="10" actId="14100"/>
+          <ac:cxnSpMkLst>
+            <pc:docMk/>
+            <pc:sldMk cId="3208764681" sldId="257"/>
+            <ac:cxnSpMk id="480" creationId="{DDCD0502-9E39-4C04-B2CC-65DC0E8957B8}"/>
+          </ac:cxnSpMkLst>
+        </pc:cxnChg>
+        <pc:cxnChg chg="del">
+          <ac:chgData name="Åsmund Runningen" userId="fcfce1d5-2d35-4b5c-86f4-e24bd46c268e" providerId="ADAL" clId="{939B8C75-5EAA-43CB-989D-A0CCA3F7B510}" dt="2019-03-30T19:06:20.739" v="6" actId="478"/>
+          <ac:cxnSpMkLst>
+            <pc:docMk/>
+            <pc:sldMk cId="3208764681" sldId="257"/>
+            <ac:cxnSpMk id="484" creationId="{F9C7F262-B21F-421A-8CFC-13115E363C22}"/>
+          </ac:cxnSpMkLst>
+        </pc:cxnChg>
+        <pc:cxnChg chg="mod">
+          <ac:chgData name="Åsmund Runningen" userId="fcfce1d5-2d35-4b5c-86f4-e24bd46c268e" providerId="ADAL" clId="{939B8C75-5EAA-43CB-989D-A0CCA3F7B510}" dt="2019-03-30T19:06:29.349" v="8" actId="14100"/>
+          <ac:cxnSpMkLst>
+            <pc:docMk/>
+            <pc:sldMk cId="3208764681" sldId="257"/>
+            <ac:cxnSpMk id="718" creationId="{029D23E5-170F-4CBD-9135-663AAF21B8BB}"/>
+          </ac:cxnSpMkLst>
+        </pc:cxnChg>
+        <pc:cxnChg chg="mod">
+          <ac:chgData name="Åsmund Runningen" userId="fcfce1d5-2d35-4b5c-86f4-e24bd46c268e" providerId="ADAL" clId="{939B8C75-5EAA-43CB-989D-A0CCA3F7B510}" dt="2019-03-30T19:06:34.908" v="9" actId="14100"/>
+          <ac:cxnSpMkLst>
+            <pc:docMk/>
+            <pc:sldMk cId="3208764681" sldId="257"/>
+            <ac:cxnSpMk id="723" creationId="{671733A5-C2F5-4ECC-BBCD-949FB68D9DA7}"/>
+          </ac:cxnSpMkLst>
+        </pc:cxnChg>
+        <pc:cxnChg chg="del">
+          <ac:chgData name="Åsmund Runningen" userId="fcfce1d5-2d35-4b5c-86f4-e24bd46c268e" providerId="ADAL" clId="{939B8C75-5EAA-43CB-989D-A0CCA3F7B510}" dt="2019-03-30T19:06:22.412" v="7" actId="478"/>
+          <ac:cxnSpMkLst>
+            <pc:docMk/>
+            <pc:sldMk cId="3208764681" sldId="257"/>
+            <ac:cxnSpMk id="724" creationId="{210C2753-06AA-4123-B95A-E602E8036B46}"/>
           </ac:cxnSpMkLst>
         </pc:cxnChg>
       </pc:sldChg>
@@ -31501,7 +31597,7 @@
         <p:spPr>
           <a:xfrm>
             <a:off x="7098051" y="2180429"/>
-            <a:ext cx="666552" cy="0"/>
+            <a:ext cx="2027550" cy="0"/>
           </a:xfrm>
           <a:prstGeom prst="line">
             <a:avLst/>
@@ -31615,45 +31711,7 @@
         <p:spPr>
           <a:xfrm>
             <a:off x="7156589" y="2447560"/>
-            <a:ext cx="596581" cy="0"/>
-          </a:xfrm>
-          <a:prstGeom prst="line">
-            <a:avLst/>
-          </a:prstGeom>
-        </p:spPr>
-        <p:style>
-          <a:lnRef idx="1">
-            <a:schemeClr val="accent1"/>
-          </a:lnRef>
-          <a:fillRef idx="0">
-            <a:schemeClr val="accent1"/>
-          </a:fillRef>
-          <a:effectRef idx="0">
-            <a:schemeClr val="accent1"/>
-          </a:effectRef>
-          <a:fontRef idx="minor">
-            <a:schemeClr val="tx1"/>
-          </a:fontRef>
-        </p:style>
-      </p:cxnSp>
-      <p:cxnSp>
-        <p:nvCxnSpPr>
-          <p:cNvPr id="724" name="Rett linje 723">
-            <a:extLst>
-              <a:ext uri="{FF2B5EF4-FFF2-40B4-BE49-F238E27FC236}">
-                <a16:creationId xmlns:a16="http://schemas.microsoft.com/office/drawing/2014/main" id="{210C2753-06AA-4123-B95A-E602E8036B46}"/>
-              </a:ext>
-            </a:extLst>
-          </p:cNvPr>
-          <p:cNvCxnSpPr>
-            <a:cxnSpLocks/>
-          </p:cNvCxnSpPr>
-          <p:nvPr/>
-        </p:nvCxnSpPr>
-        <p:spPr>
-          <a:xfrm>
-            <a:off x="8285597" y="2721149"/>
-            <a:ext cx="1235600" cy="0"/>
+            <a:ext cx="2166240" cy="0"/>
           </a:xfrm>
           <a:prstGeom prst="line">
             <a:avLst/>
@@ -34776,1865 +34834,6 @@
           </a:fontRef>
         </p:style>
       </p:cxnSp>
-      <p:grpSp>
-        <p:nvGrpSpPr>
-          <p:cNvPr id="415" name="Gruppe 414">
-            <a:extLst>
-              <a:ext uri="{FF2B5EF4-FFF2-40B4-BE49-F238E27FC236}">
-                <a16:creationId xmlns:a16="http://schemas.microsoft.com/office/drawing/2014/main" id="{AA2BB301-ADAF-4C4C-A8B8-0E146D25B086}"/>
-              </a:ext>
-            </a:extLst>
-          </p:cNvPr>
-          <p:cNvGrpSpPr/>
-          <p:nvPr/>
-        </p:nvGrpSpPr>
-        <p:grpSpPr>
-          <a:xfrm>
-            <a:off x="7761325" y="2141965"/>
-            <a:ext cx="547892" cy="82736"/>
-            <a:chOff x="8835366" y="3579958"/>
-            <a:chExt cx="2941057" cy="495156"/>
-          </a:xfrm>
-        </p:grpSpPr>
-        <p:cxnSp>
-          <p:nvCxnSpPr>
-            <p:cNvPr id="416" name="Rett linje 415">
-              <a:extLst>
-                <a:ext uri="{FF2B5EF4-FFF2-40B4-BE49-F238E27FC236}">
-                  <a16:creationId xmlns:a16="http://schemas.microsoft.com/office/drawing/2014/main" id="{5599A19F-9F30-439C-B647-61E739FBA1C5}"/>
-                </a:ext>
-              </a:extLst>
-            </p:cNvPr>
-            <p:cNvCxnSpPr>
-              <a:cxnSpLocks/>
-            </p:cNvCxnSpPr>
-            <p:nvPr/>
-          </p:nvCxnSpPr>
-          <p:spPr>
-            <a:xfrm rot="5400000">
-              <a:off x="11531402" y="3824631"/>
-              <a:ext cx="245021" cy="245021"/>
-            </a:xfrm>
-            <a:prstGeom prst="line">
-              <a:avLst/>
-            </a:prstGeom>
-          </p:spPr>
-          <p:style>
-            <a:lnRef idx="1">
-              <a:schemeClr val="accent1"/>
-            </a:lnRef>
-            <a:fillRef idx="0">
-              <a:schemeClr val="accent1"/>
-            </a:fillRef>
-            <a:effectRef idx="0">
-              <a:schemeClr val="accent1"/>
-            </a:effectRef>
-            <a:fontRef idx="minor">
-              <a:schemeClr val="tx1"/>
-            </a:fontRef>
-          </p:style>
-        </p:cxnSp>
-        <p:grpSp>
-          <p:nvGrpSpPr>
-            <p:cNvPr id="417" name="Gruppe 416">
-              <a:extLst>
-                <a:ext uri="{FF2B5EF4-FFF2-40B4-BE49-F238E27FC236}">
-                  <a16:creationId xmlns:a16="http://schemas.microsoft.com/office/drawing/2014/main" id="{0B29FA8F-EA6C-497C-83CB-F811CC5AC2F0}"/>
-                </a:ext>
-              </a:extLst>
-            </p:cNvPr>
-            <p:cNvGrpSpPr/>
-            <p:nvPr/>
-          </p:nvGrpSpPr>
-          <p:grpSpPr>
-            <a:xfrm rot="5400000" flipH="1">
-              <a:off x="11037517" y="3579947"/>
-              <a:ext cx="489693" cy="489717"/>
-              <a:chOff x="10429077" y="2971507"/>
-              <a:chExt cx="489693" cy="489717"/>
-            </a:xfrm>
-          </p:grpSpPr>
-          <p:cxnSp>
-            <p:nvCxnSpPr>
-              <p:cNvPr id="430" name="Rett linje 429">
-                <a:extLst>
-                  <a:ext uri="{FF2B5EF4-FFF2-40B4-BE49-F238E27FC236}">
-                    <a16:creationId xmlns:a16="http://schemas.microsoft.com/office/drawing/2014/main" id="{6EE3E795-78E2-4345-BA63-40A29D130595}"/>
-                  </a:ext>
-                </a:extLst>
-              </p:cNvPr>
-              <p:cNvCxnSpPr>
-                <a:cxnSpLocks/>
-              </p:cNvCxnSpPr>
-              <p:nvPr/>
-            </p:nvCxnSpPr>
-            <p:spPr>
-              <a:xfrm flipH="1" flipV="1">
-                <a:off x="10429077" y="2971507"/>
-                <a:ext cx="245021" cy="245021"/>
-              </a:xfrm>
-              <a:prstGeom prst="line">
-                <a:avLst/>
-              </a:prstGeom>
-            </p:spPr>
-            <p:style>
-              <a:lnRef idx="1">
-                <a:schemeClr val="accent1"/>
-              </a:lnRef>
-              <a:fillRef idx="0">
-                <a:schemeClr val="accent1"/>
-              </a:fillRef>
-              <a:effectRef idx="0">
-                <a:schemeClr val="accent1"/>
-              </a:effectRef>
-              <a:fontRef idx="minor">
-                <a:schemeClr val="tx1"/>
-              </a:fontRef>
-            </p:style>
-          </p:cxnSp>
-          <p:cxnSp>
-            <p:nvCxnSpPr>
-              <p:cNvPr id="431" name="Rett linje 430">
-                <a:extLst>
-                  <a:ext uri="{FF2B5EF4-FFF2-40B4-BE49-F238E27FC236}">
-                    <a16:creationId xmlns:a16="http://schemas.microsoft.com/office/drawing/2014/main" id="{CB51BA65-AFD7-4E4E-BA81-0CFD528F8B19}"/>
-                  </a:ext>
-                </a:extLst>
-              </p:cNvPr>
-              <p:cNvCxnSpPr>
-                <a:cxnSpLocks/>
-              </p:cNvCxnSpPr>
-              <p:nvPr/>
-            </p:nvCxnSpPr>
-            <p:spPr>
-              <a:xfrm flipH="1" flipV="1">
-                <a:off x="10673749" y="3216203"/>
-                <a:ext cx="245021" cy="245021"/>
-              </a:xfrm>
-              <a:prstGeom prst="line">
-                <a:avLst/>
-              </a:prstGeom>
-            </p:spPr>
-            <p:style>
-              <a:lnRef idx="1">
-                <a:schemeClr val="accent1"/>
-              </a:lnRef>
-              <a:fillRef idx="0">
-                <a:schemeClr val="accent1"/>
-              </a:fillRef>
-              <a:effectRef idx="0">
-                <a:schemeClr val="accent1"/>
-              </a:effectRef>
-              <a:fontRef idx="minor">
-                <a:schemeClr val="tx1"/>
-              </a:fontRef>
-            </p:style>
-          </p:cxnSp>
-        </p:grpSp>
-        <p:grpSp>
-          <p:nvGrpSpPr>
-            <p:cNvPr id="418" name="Gruppe 417">
-              <a:extLst>
-                <a:ext uri="{FF2B5EF4-FFF2-40B4-BE49-F238E27FC236}">
-                  <a16:creationId xmlns:a16="http://schemas.microsoft.com/office/drawing/2014/main" id="{ABB3CAF7-E270-4EF7-9450-1CC38F0EF51A}"/>
-                </a:ext>
-              </a:extLst>
-            </p:cNvPr>
-            <p:cNvGrpSpPr/>
-            <p:nvPr/>
-          </p:nvGrpSpPr>
-          <p:grpSpPr>
-            <a:xfrm rot="5400000" flipH="1">
-              <a:off x="10546105" y="3582658"/>
-              <a:ext cx="490043" cy="489392"/>
-              <a:chOff x="10428726" y="3460899"/>
-              <a:chExt cx="490043" cy="489392"/>
-            </a:xfrm>
-          </p:grpSpPr>
-          <p:cxnSp>
-            <p:nvCxnSpPr>
-              <p:cNvPr id="428" name="Rett linje 427">
-                <a:extLst>
-                  <a:ext uri="{FF2B5EF4-FFF2-40B4-BE49-F238E27FC236}">
-                    <a16:creationId xmlns:a16="http://schemas.microsoft.com/office/drawing/2014/main" id="{73DABA11-0793-448D-B93A-69259FF43D13}"/>
-                  </a:ext>
-                </a:extLst>
-              </p:cNvPr>
-              <p:cNvCxnSpPr/>
-              <p:nvPr/>
-            </p:nvCxnSpPr>
-            <p:spPr>
-              <a:xfrm flipH="1">
-                <a:off x="10673748" y="3460899"/>
-                <a:ext cx="245021" cy="245021"/>
-              </a:xfrm>
-              <a:prstGeom prst="line">
-                <a:avLst/>
-              </a:prstGeom>
-            </p:spPr>
-            <p:style>
-              <a:lnRef idx="1">
-                <a:schemeClr val="accent1"/>
-              </a:lnRef>
-              <a:fillRef idx="0">
-                <a:schemeClr val="accent1"/>
-              </a:fillRef>
-              <a:effectRef idx="0">
-                <a:schemeClr val="accent1"/>
-              </a:effectRef>
-              <a:fontRef idx="minor">
-                <a:schemeClr val="tx1"/>
-              </a:fontRef>
-            </p:style>
-          </p:cxnSp>
-          <p:cxnSp>
-            <p:nvCxnSpPr>
-              <p:cNvPr id="429" name="Rett linje 428">
-                <a:extLst>
-                  <a:ext uri="{FF2B5EF4-FFF2-40B4-BE49-F238E27FC236}">
-                    <a16:creationId xmlns:a16="http://schemas.microsoft.com/office/drawing/2014/main" id="{39CE7D9F-B69A-4BDC-9ED9-ECA4F33C2E6A}"/>
-                  </a:ext>
-                </a:extLst>
-              </p:cNvPr>
-              <p:cNvCxnSpPr/>
-              <p:nvPr/>
-            </p:nvCxnSpPr>
-            <p:spPr>
-              <a:xfrm flipH="1">
-                <a:off x="10428726" y="3705270"/>
-                <a:ext cx="245021" cy="245021"/>
-              </a:xfrm>
-              <a:prstGeom prst="line">
-                <a:avLst/>
-              </a:prstGeom>
-            </p:spPr>
-            <p:style>
-              <a:lnRef idx="1">
-                <a:schemeClr val="accent1"/>
-              </a:lnRef>
-              <a:fillRef idx="0">
-                <a:schemeClr val="accent1"/>
-              </a:fillRef>
-              <a:effectRef idx="0">
-                <a:schemeClr val="accent1"/>
-              </a:effectRef>
-              <a:fontRef idx="minor">
-                <a:schemeClr val="tx1"/>
-              </a:fontRef>
-            </p:style>
-          </p:cxnSp>
-        </p:grpSp>
-        <p:grpSp>
-          <p:nvGrpSpPr>
-            <p:cNvPr id="419" name="Gruppe 418">
-              <a:extLst>
-                <a:ext uri="{FF2B5EF4-FFF2-40B4-BE49-F238E27FC236}">
-                  <a16:creationId xmlns:a16="http://schemas.microsoft.com/office/drawing/2014/main" id="{5EA0D27B-07A4-4BFE-8998-207E34C69E93}"/>
-                </a:ext>
-              </a:extLst>
-            </p:cNvPr>
-            <p:cNvGrpSpPr/>
-            <p:nvPr/>
-          </p:nvGrpSpPr>
-          <p:grpSpPr>
-            <a:xfrm rot="5400000" flipH="1">
-              <a:off x="10054716" y="3580298"/>
-              <a:ext cx="489693" cy="489717"/>
-              <a:chOff x="10429077" y="2971507"/>
-              <a:chExt cx="489693" cy="489717"/>
-            </a:xfrm>
-          </p:grpSpPr>
-          <p:cxnSp>
-            <p:nvCxnSpPr>
-              <p:cNvPr id="426" name="Rett linje 425">
-                <a:extLst>
-                  <a:ext uri="{FF2B5EF4-FFF2-40B4-BE49-F238E27FC236}">
-                    <a16:creationId xmlns:a16="http://schemas.microsoft.com/office/drawing/2014/main" id="{C625B3D9-DDBC-43C0-B5C8-F462FE1CCED0}"/>
-                  </a:ext>
-                </a:extLst>
-              </p:cNvPr>
-              <p:cNvCxnSpPr>
-                <a:cxnSpLocks/>
-              </p:cNvCxnSpPr>
-              <p:nvPr/>
-            </p:nvCxnSpPr>
-            <p:spPr>
-              <a:xfrm flipH="1" flipV="1">
-                <a:off x="10429077" y="2971507"/>
-                <a:ext cx="245021" cy="245021"/>
-              </a:xfrm>
-              <a:prstGeom prst="line">
-                <a:avLst/>
-              </a:prstGeom>
-            </p:spPr>
-            <p:style>
-              <a:lnRef idx="1">
-                <a:schemeClr val="accent1"/>
-              </a:lnRef>
-              <a:fillRef idx="0">
-                <a:schemeClr val="accent1"/>
-              </a:fillRef>
-              <a:effectRef idx="0">
-                <a:schemeClr val="accent1"/>
-              </a:effectRef>
-              <a:fontRef idx="minor">
-                <a:schemeClr val="tx1"/>
-              </a:fontRef>
-            </p:style>
-          </p:cxnSp>
-          <p:cxnSp>
-            <p:nvCxnSpPr>
-              <p:cNvPr id="427" name="Rett linje 426">
-                <a:extLst>
-                  <a:ext uri="{FF2B5EF4-FFF2-40B4-BE49-F238E27FC236}">
-                    <a16:creationId xmlns:a16="http://schemas.microsoft.com/office/drawing/2014/main" id="{FFBE4665-D031-420B-B984-F2659C484FA6}"/>
-                  </a:ext>
-                </a:extLst>
-              </p:cNvPr>
-              <p:cNvCxnSpPr>
-                <a:cxnSpLocks/>
-              </p:cNvCxnSpPr>
-              <p:nvPr/>
-            </p:nvCxnSpPr>
-            <p:spPr>
-              <a:xfrm flipH="1" flipV="1">
-                <a:off x="10673749" y="3216203"/>
-                <a:ext cx="245021" cy="245021"/>
-              </a:xfrm>
-              <a:prstGeom prst="line">
-                <a:avLst/>
-              </a:prstGeom>
-            </p:spPr>
-            <p:style>
-              <a:lnRef idx="1">
-                <a:schemeClr val="accent1"/>
-              </a:lnRef>
-              <a:fillRef idx="0">
-                <a:schemeClr val="accent1"/>
-              </a:fillRef>
-              <a:effectRef idx="0">
-                <a:schemeClr val="accent1"/>
-              </a:effectRef>
-              <a:fontRef idx="minor">
-                <a:schemeClr val="tx1"/>
-              </a:fontRef>
-            </p:style>
-          </p:cxnSp>
-        </p:grpSp>
-        <p:grpSp>
-          <p:nvGrpSpPr>
-            <p:cNvPr id="420" name="Gruppe 419">
-              <a:extLst>
-                <a:ext uri="{FF2B5EF4-FFF2-40B4-BE49-F238E27FC236}">
-                  <a16:creationId xmlns:a16="http://schemas.microsoft.com/office/drawing/2014/main" id="{F1D67DCA-3BE3-4A13-ADAE-63B526FB3701}"/>
-                </a:ext>
-              </a:extLst>
-            </p:cNvPr>
-            <p:cNvGrpSpPr/>
-            <p:nvPr/>
-          </p:nvGrpSpPr>
-          <p:grpSpPr>
-            <a:xfrm rot="5400000" flipH="1">
-              <a:off x="9565637" y="3585397"/>
-              <a:ext cx="490043" cy="489392"/>
-              <a:chOff x="10428726" y="3460899"/>
-              <a:chExt cx="490043" cy="489392"/>
-            </a:xfrm>
-          </p:grpSpPr>
-          <p:cxnSp>
-            <p:nvCxnSpPr>
-              <p:cNvPr id="424" name="Rett linje 423">
-                <a:extLst>
-                  <a:ext uri="{FF2B5EF4-FFF2-40B4-BE49-F238E27FC236}">
-                    <a16:creationId xmlns:a16="http://schemas.microsoft.com/office/drawing/2014/main" id="{3F9B9CC5-CB93-41CA-BEAD-E9857C0D1458}"/>
-                  </a:ext>
-                </a:extLst>
-              </p:cNvPr>
-              <p:cNvCxnSpPr/>
-              <p:nvPr/>
-            </p:nvCxnSpPr>
-            <p:spPr>
-              <a:xfrm flipH="1">
-                <a:off x="10673748" y="3460899"/>
-                <a:ext cx="245021" cy="245021"/>
-              </a:xfrm>
-              <a:prstGeom prst="line">
-                <a:avLst/>
-              </a:prstGeom>
-            </p:spPr>
-            <p:style>
-              <a:lnRef idx="1">
-                <a:schemeClr val="accent1"/>
-              </a:lnRef>
-              <a:fillRef idx="0">
-                <a:schemeClr val="accent1"/>
-              </a:fillRef>
-              <a:effectRef idx="0">
-                <a:schemeClr val="accent1"/>
-              </a:effectRef>
-              <a:fontRef idx="minor">
-                <a:schemeClr val="tx1"/>
-              </a:fontRef>
-            </p:style>
-          </p:cxnSp>
-          <p:cxnSp>
-            <p:nvCxnSpPr>
-              <p:cNvPr id="425" name="Rett linje 424">
-                <a:extLst>
-                  <a:ext uri="{FF2B5EF4-FFF2-40B4-BE49-F238E27FC236}">
-                    <a16:creationId xmlns:a16="http://schemas.microsoft.com/office/drawing/2014/main" id="{16683C5E-6180-4EBD-80F8-413FC14C4F41}"/>
-                  </a:ext>
-                </a:extLst>
-              </p:cNvPr>
-              <p:cNvCxnSpPr/>
-              <p:nvPr/>
-            </p:nvCxnSpPr>
-            <p:spPr>
-              <a:xfrm flipH="1">
-                <a:off x="10428726" y="3705270"/>
-                <a:ext cx="245021" cy="245021"/>
-              </a:xfrm>
-              <a:prstGeom prst="line">
-                <a:avLst/>
-              </a:prstGeom>
-            </p:spPr>
-            <p:style>
-              <a:lnRef idx="1">
-                <a:schemeClr val="accent1"/>
-              </a:lnRef>
-              <a:fillRef idx="0">
-                <a:schemeClr val="accent1"/>
-              </a:fillRef>
-              <a:effectRef idx="0">
-                <a:schemeClr val="accent1"/>
-              </a:effectRef>
-              <a:fontRef idx="minor">
-                <a:schemeClr val="tx1"/>
-              </a:fontRef>
-            </p:style>
-          </p:cxnSp>
-        </p:grpSp>
-        <p:cxnSp>
-          <p:nvCxnSpPr>
-            <p:cNvPr id="421" name="Rett linje 420">
-              <a:extLst>
-                <a:ext uri="{FF2B5EF4-FFF2-40B4-BE49-F238E27FC236}">
-                  <a16:creationId xmlns:a16="http://schemas.microsoft.com/office/drawing/2014/main" id="{EF333F8B-A16A-481B-94C2-D099E2E5FB16}"/>
-                </a:ext>
-              </a:extLst>
-            </p:cNvPr>
-            <p:cNvCxnSpPr>
-              <a:cxnSpLocks/>
-            </p:cNvCxnSpPr>
-            <p:nvPr/>
-          </p:nvCxnSpPr>
-          <p:spPr>
-            <a:xfrm rot="5400000" flipV="1">
-              <a:off x="9322761" y="3824631"/>
-              <a:ext cx="245021" cy="245021"/>
-            </a:xfrm>
-            <a:prstGeom prst="line">
-              <a:avLst/>
-            </a:prstGeom>
-          </p:spPr>
-          <p:style>
-            <a:lnRef idx="1">
-              <a:schemeClr val="accent1"/>
-            </a:lnRef>
-            <a:fillRef idx="0">
-              <a:schemeClr val="accent1"/>
-            </a:fillRef>
-            <a:effectRef idx="0">
-              <a:schemeClr val="accent1"/>
-            </a:effectRef>
-            <a:fontRef idx="minor">
-              <a:schemeClr val="tx1"/>
-            </a:fontRef>
-          </p:style>
-        </p:cxnSp>
-        <p:cxnSp>
-          <p:nvCxnSpPr>
-            <p:cNvPr id="422" name="Rett linje 421">
-              <a:extLst>
-                <a:ext uri="{FF2B5EF4-FFF2-40B4-BE49-F238E27FC236}">
-                  <a16:creationId xmlns:a16="http://schemas.microsoft.com/office/drawing/2014/main" id="{A0E5F269-29DF-4E96-BADC-FF4C4EBFBFFD}"/>
-                </a:ext>
-              </a:extLst>
-            </p:cNvPr>
-            <p:cNvCxnSpPr>
-              <a:cxnSpLocks/>
-            </p:cNvCxnSpPr>
-            <p:nvPr/>
-          </p:nvCxnSpPr>
-          <p:spPr>
-            <a:xfrm rot="5400000" flipV="1">
-              <a:off x="9077060" y="3579958"/>
-              <a:ext cx="245021" cy="245021"/>
-            </a:xfrm>
-            <a:prstGeom prst="line">
-              <a:avLst/>
-            </a:prstGeom>
-          </p:spPr>
-          <p:style>
-            <a:lnRef idx="1">
-              <a:schemeClr val="accent1"/>
-            </a:lnRef>
-            <a:fillRef idx="0">
-              <a:schemeClr val="accent1"/>
-            </a:fillRef>
-            <a:effectRef idx="0">
-              <a:schemeClr val="accent1"/>
-            </a:effectRef>
-            <a:fontRef idx="minor">
-              <a:schemeClr val="tx1"/>
-            </a:fontRef>
-          </p:style>
-        </p:cxnSp>
-        <p:cxnSp>
-          <p:nvCxnSpPr>
-            <p:cNvPr id="423" name="Rett linje 422">
-              <a:extLst>
-                <a:ext uri="{FF2B5EF4-FFF2-40B4-BE49-F238E27FC236}">
-                  <a16:creationId xmlns:a16="http://schemas.microsoft.com/office/drawing/2014/main" id="{749D338C-02A5-4A38-B301-32E3A164C554}"/>
-                </a:ext>
-              </a:extLst>
-            </p:cNvPr>
-            <p:cNvCxnSpPr>
-              <a:cxnSpLocks/>
-            </p:cNvCxnSpPr>
-            <p:nvPr/>
-          </p:nvCxnSpPr>
-          <p:spPr>
-            <a:xfrm rot="5400000">
-              <a:off x="8835366" y="3579959"/>
-              <a:ext cx="245021" cy="245021"/>
-            </a:xfrm>
-            <a:prstGeom prst="line">
-              <a:avLst/>
-            </a:prstGeom>
-          </p:spPr>
-          <p:style>
-            <a:lnRef idx="1">
-              <a:schemeClr val="accent1"/>
-            </a:lnRef>
-            <a:fillRef idx="0">
-              <a:schemeClr val="accent1"/>
-            </a:fillRef>
-            <a:effectRef idx="0">
-              <a:schemeClr val="accent1"/>
-            </a:effectRef>
-            <a:fontRef idx="minor">
-              <a:schemeClr val="tx1"/>
-            </a:fontRef>
-          </p:style>
-        </p:cxnSp>
-      </p:grpSp>
-      <p:cxnSp>
-        <p:nvCxnSpPr>
-          <p:cNvPr id="433" name="Rett linje 432">
-            <a:extLst>
-              <a:ext uri="{FF2B5EF4-FFF2-40B4-BE49-F238E27FC236}">
-                <a16:creationId xmlns:a16="http://schemas.microsoft.com/office/drawing/2014/main" id="{6DF8B82F-FD0A-4B73-8EDC-51E135FC9E65}"/>
-              </a:ext>
-            </a:extLst>
-          </p:cNvPr>
-          <p:cNvCxnSpPr>
-            <a:cxnSpLocks/>
-          </p:cNvCxnSpPr>
-          <p:nvPr/>
-        </p:nvCxnSpPr>
-        <p:spPr>
-          <a:xfrm>
-            <a:off x="8309217" y="2180441"/>
-            <a:ext cx="816384" cy="0"/>
-          </a:xfrm>
-          <a:prstGeom prst="line">
-            <a:avLst/>
-          </a:prstGeom>
-        </p:spPr>
-        <p:style>
-          <a:lnRef idx="1">
-            <a:schemeClr val="accent1"/>
-          </a:lnRef>
-          <a:fillRef idx="0">
-            <a:schemeClr val="accent1"/>
-          </a:fillRef>
-          <a:effectRef idx="0">
-            <a:schemeClr val="accent1"/>
-          </a:effectRef>
-          <a:fontRef idx="minor">
-            <a:schemeClr val="tx1"/>
-          </a:fontRef>
-        </p:style>
-      </p:cxnSp>
-      <p:sp>
-        <p:nvSpPr>
-          <p:cNvPr id="14" name="TekstSylinder 13">
-            <a:extLst>
-              <a:ext uri="{FF2B5EF4-FFF2-40B4-BE49-F238E27FC236}">
-                <a16:creationId xmlns:a16="http://schemas.microsoft.com/office/drawing/2014/main" id="{38E9B4EB-784B-4E31-BBB4-3F8A8A589673}"/>
-              </a:ext>
-            </a:extLst>
-          </p:cNvPr>
-          <p:cNvSpPr txBox="1"/>
-          <p:nvPr/>
-        </p:nvSpPr>
-        <p:spPr>
-          <a:xfrm>
-            <a:off x="7789810" y="1963331"/>
-            <a:ext cx="468398" cy="246221"/>
-          </a:xfrm>
-          <a:prstGeom prst="rect">
-            <a:avLst/>
-          </a:prstGeom>
-          <a:noFill/>
-        </p:spPr>
-        <p:txBody>
-          <a:bodyPr wrap="none" rtlCol="0">
-            <a:spAutoFit/>
-          </a:bodyPr>
-          <a:lstStyle/>
-          <a:p>
-            <a:r>
-              <a:rPr lang="nb-NO" sz="1000" dirty="0"/>
-              <a:t>10K</a:t>
-            </a:r>
-            <a:r>
-              <a:rPr lang="el-GR" sz="1000" dirty="0"/>
-              <a:t>Ω</a:t>
-            </a:r>
-            <a:endParaRPr lang="nb-NO" sz="1000" dirty="0"/>
-          </a:p>
-        </p:txBody>
-      </p:sp>
-      <p:grpSp>
-        <p:nvGrpSpPr>
-          <p:cNvPr id="100" name="Gruppe 99">
-            <a:extLst>
-              <a:ext uri="{FF2B5EF4-FFF2-40B4-BE49-F238E27FC236}">
-                <a16:creationId xmlns:a16="http://schemas.microsoft.com/office/drawing/2014/main" id="{1CD3C71F-23C1-4ED0-A9A9-962B7F526E18}"/>
-              </a:ext>
-            </a:extLst>
-          </p:cNvPr>
-          <p:cNvGrpSpPr/>
-          <p:nvPr/>
-        </p:nvGrpSpPr>
-        <p:grpSpPr>
-          <a:xfrm>
-            <a:off x="7745793" y="2217946"/>
-            <a:ext cx="547892" cy="271468"/>
-            <a:chOff x="7580554" y="2222768"/>
-            <a:chExt cx="547892" cy="271468"/>
-          </a:xfrm>
-        </p:grpSpPr>
-        <p:sp>
-          <p:nvSpPr>
-            <p:cNvPr id="436" name="TekstSylinder 435">
-              <a:extLst>
-                <a:ext uri="{FF2B5EF4-FFF2-40B4-BE49-F238E27FC236}">
-                  <a16:creationId xmlns:a16="http://schemas.microsoft.com/office/drawing/2014/main" id="{84166857-3879-4382-8517-19800A968B71}"/>
-                </a:ext>
-              </a:extLst>
-            </p:cNvPr>
-            <p:cNvSpPr txBox="1"/>
-            <p:nvPr/>
-          </p:nvSpPr>
-          <p:spPr>
-            <a:xfrm>
-              <a:off x="7623497" y="2222768"/>
-              <a:ext cx="468398" cy="246221"/>
-            </a:xfrm>
-            <a:prstGeom prst="rect">
-              <a:avLst/>
-            </a:prstGeom>
-            <a:noFill/>
-          </p:spPr>
-          <p:txBody>
-            <a:bodyPr wrap="none" rtlCol="0">
-              <a:spAutoFit/>
-            </a:bodyPr>
-            <a:lstStyle/>
-            <a:p>
-              <a:r>
-                <a:rPr lang="nb-NO" sz="1000" dirty="0"/>
-                <a:t>10K</a:t>
-              </a:r>
-              <a:r>
-                <a:rPr lang="el-GR" sz="1000" dirty="0"/>
-                <a:t>Ω</a:t>
-              </a:r>
-              <a:endParaRPr lang="nb-NO" sz="1000" dirty="0"/>
-            </a:p>
-          </p:txBody>
-        </p:sp>
-        <p:grpSp>
-          <p:nvGrpSpPr>
-            <p:cNvPr id="438" name="Gruppe 437">
-              <a:extLst>
-                <a:ext uri="{FF2B5EF4-FFF2-40B4-BE49-F238E27FC236}">
-                  <a16:creationId xmlns:a16="http://schemas.microsoft.com/office/drawing/2014/main" id="{D22C1C85-BCAF-448B-B20E-9BAB9FB78AC8}"/>
-                </a:ext>
-              </a:extLst>
-            </p:cNvPr>
-            <p:cNvGrpSpPr/>
-            <p:nvPr/>
-          </p:nvGrpSpPr>
-          <p:grpSpPr>
-            <a:xfrm>
-              <a:off x="7580554" y="2411500"/>
-              <a:ext cx="547892" cy="82736"/>
-              <a:chOff x="8835366" y="3579958"/>
-              <a:chExt cx="2941057" cy="495156"/>
-            </a:xfrm>
-          </p:grpSpPr>
-          <p:cxnSp>
-            <p:nvCxnSpPr>
-              <p:cNvPr id="439" name="Rett linje 438">
-                <a:extLst>
-                  <a:ext uri="{FF2B5EF4-FFF2-40B4-BE49-F238E27FC236}">
-                    <a16:creationId xmlns:a16="http://schemas.microsoft.com/office/drawing/2014/main" id="{00EA0B58-4615-4054-A074-552CDD1EA86D}"/>
-                  </a:ext>
-                </a:extLst>
-              </p:cNvPr>
-              <p:cNvCxnSpPr>
-                <a:cxnSpLocks/>
-              </p:cNvCxnSpPr>
-              <p:nvPr/>
-            </p:nvCxnSpPr>
-            <p:spPr>
-              <a:xfrm rot="5400000">
-                <a:off x="11531402" y="3824631"/>
-                <a:ext cx="245021" cy="245021"/>
-              </a:xfrm>
-              <a:prstGeom prst="line">
-                <a:avLst/>
-              </a:prstGeom>
-            </p:spPr>
-            <p:style>
-              <a:lnRef idx="1">
-                <a:schemeClr val="accent1"/>
-              </a:lnRef>
-              <a:fillRef idx="0">
-                <a:schemeClr val="accent1"/>
-              </a:fillRef>
-              <a:effectRef idx="0">
-                <a:schemeClr val="accent1"/>
-              </a:effectRef>
-              <a:fontRef idx="minor">
-                <a:schemeClr val="tx1"/>
-              </a:fontRef>
-            </p:style>
-          </p:cxnSp>
-          <p:grpSp>
-            <p:nvGrpSpPr>
-              <p:cNvPr id="440" name="Gruppe 439">
-                <a:extLst>
-                  <a:ext uri="{FF2B5EF4-FFF2-40B4-BE49-F238E27FC236}">
-                    <a16:creationId xmlns:a16="http://schemas.microsoft.com/office/drawing/2014/main" id="{464679E2-AA94-4DA8-91DE-F665F74EA1BD}"/>
-                  </a:ext>
-                </a:extLst>
-              </p:cNvPr>
-              <p:cNvGrpSpPr/>
-              <p:nvPr/>
-            </p:nvGrpSpPr>
-            <p:grpSpPr>
-              <a:xfrm rot="5400000" flipH="1">
-                <a:off x="11037517" y="3579947"/>
-                <a:ext cx="489693" cy="489717"/>
-                <a:chOff x="10429077" y="2971507"/>
-                <a:chExt cx="489693" cy="489717"/>
-              </a:xfrm>
-            </p:grpSpPr>
-            <p:cxnSp>
-              <p:nvCxnSpPr>
-                <p:cNvPr id="453" name="Rett linje 452">
-                  <a:extLst>
-                    <a:ext uri="{FF2B5EF4-FFF2-40B4-BE49-F238E27FC236}">
-                      <a16:creationId xmlns:a16="http://schemas.microsoft.com/office/drawing/2014/main" id="{20BE3218-5D45-4813-BD26-C9A9961787E1}"/>
-                    </a:ext>
-                  </a:extLst>
-                </p:cNvPr>
-                <p:cNvCxnSpPr>
-                  <a:cxnSpLocks/>
-                </p:cNvCxnSpPr>
-                <p:nvPr/>
-              </p:nvCxnSpPr>
-              <p:spPr>
-                <a:xfrm flipH="1" flipV="1">
-                  <a:off x="10429077" y="2971507"/>
-                  <a:ext cx="245021" cy="245021"/>
-                </a:xfrm>
-                <a:prstGeom prst="line">
-                  <a:avLst/>
-                </a:prstGeom>
-              </p:spPr>
-              <p:style>
-                <a:lnRef idx="1">
-                  <a:schemeClr val="accent1"/>
-                </a:lnRef>
-                <a:fillRef idx="0">
-                  <a:schemeClr val="accent1"/>
-                </a:fillRef>
-                <a:effectRef idx="0">
-                  <a:schemeClr val="accent1"/>
-                </a:effectRef>
-                <a:fontRef idx="minor">
-                  <a:schemeClr val="tx1"/>
-                </a:fontRef>
-              </p:style>
-            </p:cxnSp>
-            <p:cxnSp>
-              <p:nvCxnSpPr>
-                <p:cNvPr id="454" name="Rett linje 453">
-                  <a:extLst>
-                    <a:ext uri="{FF2B5EF4-FFF2-40B4-BE49-F238E27FC236}">
-                      <a16:creationId xmlns:a16="http://schemas.microsoft.com/office/drawing/2014/main" id="{43E084F0-CEED-45A0-9E54-A4E581002611}"/>
-                    </a:ext>
-                  </a:extLst>
-                </p:cNvPr>
-                <p:cNvCxnSpPr>
-                  <a:cxnSpLocks/>
-                </p:cNvCxnSpPr>
-                <p:nvPr/>
-              </p:nvCxnSpPr>
-              <p:spPr>
-                <a:xfrm flipH="1" flipV="1">
-                  <a:off x="10673749" y="3216203"/>
-                  <a:ext cx="245021" cy="245021"/>
-                </a:xfrm>
-                <a:prstGeom prst="line">
-                  <a:avLst/>
-                </a:prstGeom>
-              </p:spPr>
-              <p:style>
-                <a:lnRef idx="1">
-                  <a:schemeClr val="accent1"/>
-                </a:lnRef>
-                <a:fillRef idx="0">
-                  <a:schemeClr val="accent1"/>
-                </a:fillRef>
-                <a:effectRef idx="0">
-                  <a:schemeClr val="accent1"/>
-                </a:effectRef>
-                <a:fontRef idx="minor">
-                  <a:schemeClr val="tx1"/>
-                </a:fontRef>
-              </p:style>
-            </p:cxnSp>
-          </p:grpSp>
-          <p:grpSp>
-            <p:nvGrpSpPr>
-              <p:cNvPr id="441" name="Gruppe 440">
-                <a:extLst>
-                  <a:ext uri="{FF2B5EF4-FFF2-40B4-BE49-F238E27FC236}">
-                    <a16:creationId xmlns:a16="http://schemas.microsoft.com/office/drawing/2014/main" id="{F1FB020D-E655-4D6A-8E3D-B85620E48C2F}"/>
-                  </a:ext>
-                </a:extLst>
-              </p:cNvPr>
-              <p:cNvGrpSpPr/>
-              <p:nvPr/>
-            </p:nvGrpSpPr>
-            <p:grpSpPr>
-              <a:xfrm rot="5400000" flipH="1">
-                <a:off x="10546105" y="3582658"/>
-                <a:ext cx="490043" cy="489392"/>
-                <a:chOff x="10428726" y="3460899"/>
-                <a:chExt cx="490043" cy="489392"/>
-              </a:xfrm>
-            </p:grpSpPr>
-            <p:cxnSp>
-              <p:nvCxnSpPr>
-                <p:cNvPr id="451" name="Rett linje 450">
-                  <a:extLst>
-                    <a:ext uri="{FF2B5EF4-FFF2-40B4-BE49-F238E27FC236}">
-                      <a16:creationId xmlns:a16="http://schemas.microsoft.com/office/drawing/2014/main" id="{8CC06F20-CCC1-4B38-BF5F-F983133DA028}"/>
-                    </a:ext>
-                  </a:extLst>
-                </p:cNvPr>
-                <p:cNvCxnSpPr/>
-                <p:nvPr/>
-              </p:nvCxnSpPr>
-              <p:spPr>
-                <a:xfrm flipH="1">
-                  <a:off x="10673748" y="3460899"/>
-                  <a:ext cx="245021" cy="245021"/>
-                </a:xfrm>
-                <a:prstGeom prst="line">
-                  <a:avLst/>
-                </a:prstGeom>
-              </p:spPr>
-              <p:style>
-                <a:lnRef idx="1">
-                  <a:schemeClr val="accent1"/>
-                </a:lnRef>
-                <a:fillRef idx="0">
-                  <a:schemeClr val="accent1"/>
-                </a:fillRef>
-                <a:effectRef idx="0">
-                  <a:schemeClr val="accent1"/>
-                </a:effectRef>
-                <a:fontRef idx="minor">
-                  <a:schemeClr val="tx1"/>
-                </a:fontRef>
-              </p:style>
-            </p:cxnSp>
-            <p:cxnSp>
-              <p:nvCxnSpPr>
-                <p:cNvPr id="452" name="Rett linje 451">
-                  <a:extLst>
-                    <a:ext uri="{FF2B5EF4-FFF2-40B4-BE49-F238E27FC236}">
-                      <a16:creationId xmlns:a16="http://schemas.microsoft.com/office/drawing/2014/main" id="{BAB69205-AA40-4B70-A9D5-1464EFB4A9EB}"/>
-                    </a:ext>
-                  </a:extLst>
-                </p:cNvPr>
-                <p:cNvCxnSpPr/>
-                <p:nvPr/>
-              </p:nvCxnSpPr>
-              <p:spPr>
-                <a:xfrm flipH="1">
-                  <a:off x="10428726" y="3705270"/>
-                  <a:ext cx="245021" cy="245021"/>
-                </a:xfrm>
-                <a:prstGeom prst="line">
-                  <a:avLst/>
-                </a:prstGeom>
-              </p:spPr>
-              <p:style>
-                <a:lnRef idx="1">
-                  <a:schemeClr val="accent1"/>
-                </a:lnRef>
-                <a:fillRef idx="0">
-                  <a:schemeClr val="accent1"/>
-                </a:fillRef>
-                <a:effectRef idx="0">
-                  <a:schemeClr val="accent1"/>
-                </a:effectRef>
-                <a:fontRef idx="minor">
-                  <a:schemeClr val="tx1"/>
-                </a:fontRef>
-              </p:style>
-            </p:cxnSp>
-          </p:grpSp>
-          <p:grpSp>
-            <p:nvGrpSpPr>
-              <p:cNvPr id="442" name="Gruppe 441">
-                <a:extLst>
-                  <a:ext uri="{FF2B5EF4-FFF2-40B4-BE49-F238E27FC236}">
-                    <a16:creationId xmlns:a16="http://schemas.microsoft.com/office/drawing/2014/main" id="{5910DD8B-BF38-431F-BBCD-63F1ABF45F60}"/>
-                  </a:ext>
-                </a:extLst>
-              </p:cNvPr>
-              <p:cNvGrpSpPr/>
-              <p:nvPr/>
-            </p:nvGrpSpPr>
-            <p:grpSpPr>
-              <a:xfrm rot="5400000" flipH="1">
-                <a:off x="10054716" y="3580298"/>
-                <a:ext cx="489693" cy="489717"/>
-                <a:chOff x="10429077" y="2971507"/>
-                <a:chExt cx="489693" cy="489717"/>
-              </a:xfrm>
-            </p:grpSpPr>
-            <p:cxnSp>
-              <p:nvCxnSpPr>
-                <p:cNvPr id="449" name="Rett linje 448">
-                  <a:extLst>
-                    <a:ext uri="{FF2B5EF4-FFF2-40B4-BE49-F238E27FC236}">
-                      <a16:creationId xmlns:a16="http://schemas.microsoft.com/office/drawing/2014/main" id="{6E3CC362-E3CE-487E-91E7-D411FC735118}"/>
-                    </a:ext>
-                  </a:extLst>
-                </p:cNvPr>
-                <p:cNvCxnSpPr>
-                  <a:cxnSpLocks/>
-                </p:cNvCxnSpPr>
-                <p:nvPr/>
-              </p:nvCxnSpPr>
-              <p:spPr>
-                <a:xfrm flipH="1" flipV="1">
-                  <a:off x="10429077" y="2971507"/>
-                  <a:ext cx="245021" cy="245021"/>
-                </a:xfrm>
-                <a:prstGeom prst="line">
-                  <a:avLst/>
-                </a:prstGeom>
-              </p:spPr>
-              <p:style>
-                <a:lnRef idx="1">
-                  <a:schemeClr val="accent1"/>
-                </a:lnRef>
-                <a:fillRef idx="0">
-                  <a:schemeClr val="accent1"/>
-                </a:fillRef>
-                <a:effectRef idx="0">
-                  <a:schemeClr val="accent1"/>
-                </a:effectRef>
-                <a:fontRef idx="minor">
-                  <a:schemeClr val="tx1"/>
-                </a:fontRef>
-              </p:style>
-            </p:cxnSp>
-            <p:cxnSp>
-              <p:nvCxnSpPr>
-                <p:cNvPr id="450" name="Rett linje 449">
-                  <a:extLst>
-                    <a:ext uri="{FF2B5EF4-FFF2-40B4-BE49-F238E27FC236}">
-                      <a16:creationId xmlns:a16="http://schemas.microsoft.com/office/drawing/2014/main" id="{E5781ABB-E54A-47B9-8111-61C1A7B3323C}"/>
-                    </a:ext>
-                  </a:extLst>
-                </p:cNvPr>
-                <p:cNvCxnSpPr>
-                  <a:cxnSpLocks/>
-                </p:cNvCxnSpPr>
-                <p:nvPr/>
-              </p:nvCxnSpPr>
-              <p:spPr>
-                <a:xfrm flipH="1" flipV="1">
-                  <a:off x="10673749" y="3216203"/>
-                  <a:ext cx="245021" cy="245021"/>
-                </a:xfrm>
-                <a:prstGeom prst="line">
-                  <a:avLst/>
-                </a:prstGeom>
-              </p:spPr>
-              <p:style>
-                <a:lnRef idx="1">
-                  <a:schemeClr val="accent1"/>
-                </a:lnRef>
-                <a:fillRef idx="0">
-                  <a:schemeClr val="accent1"/>
-                </a:fillRef>
-                <a:effectRef idx="0">
-                  <a:schemeClr val="accent1"/>
-                </a:effectRef>
-                <a:fontRef idx="minor">
-                  <a:schemeClr val="tx1"/>
-                </a:fontRef>
-              </p:style>
-            </p:cxnSp>
-          </p:grpSp>
-          <p:grpSp>
-            <p:nvGrpSpPr>
-              <p:cNvPr id="443" name="Gruppe 442">
-                <a:extLst>
-                  <a:ext uri="{FF2B5EF4-FFF2-40B4-BE49-F238E27FC236}">
-                    <a16:creationId xmlns:a16="http://schemas.microsoft.com/office/drawing/2014/main" id="{18249581-E71C-4019-9DCA-CEDAF7904EF1}"/>
-                  </a:ext>
-                </a:extLst>
-              </p:cNvPr>
-              <p:cNvGrpSpPr/>
-              <p:nvPr/>
-            </p:nvGrpSpPr>
-            <p:grpSpPr>
-              <a:xfrm rot="5400000" flipH="1">
-                <a:off x="9565637" y="3585397"/>
-                <a:ext cx="490043" cy="489392"/>
-                <a:chOff x="10428726" y="3460899"/>
-                <a:chExt cx="490043" cy="489392"/>
-              </a:xfrm>
-            </p:grpSpPr>
-            <p:cxnSp>
-              <p:nvCxnSpPr>
-                <p:cNvPr id="447" name="Rett linje 446">
-                  <a:extLst>
-                    <a:ext uri="{FF2B5EF4-FFF2-40B4-BE49-F238E27FC236}">
-                      <a16:creationId xmlns:a16="http://schemas.microsoft.com/office/drawing/2014/main" id="{1EDCDB93-7065-4B13-AFE5-7E12ED3EB428}"/>
-                    </a:ext>
-                  </a:extLst>
-                </p:cNvPr>
-                <p:cNvCxnSpPr/>
-                <p:nvPr/>
-              </p:nvCxnSpPr>
-              <p:spPr>
-                <a:xfrm flipH="1">
-                  <a:off x="10673748" y="3460899"/>
-                  <a:ext cx="245021" cy="245021"/>
-                </a:xfrm>
-                <a:prstGeom prst="line">
-                  <a:avLst/>
-                </a:prstGeom>
-              </p:spPr>
-              <p:style>
-                <a:lnRef idx="1">
-                  <a:schemeClr val="accent1"/>
-                </a:lnRef>
-                <a:fillRef idx="0">
-                  <a:schemeClr val="accent1"/>
-                </a:fillRef>
-                <a:effectRef idx="0">
-                  <a:schemeClr val="accent1"/>
-                </a:effectRef>
-                <a:fontRef idx="minor">
-                  <a:schemeClr val="tx1"/>
-                </a:fontRef>
-              </p:style>
-            </p:cxnSp>
-            <p:cxnSp>
-              <p:nvCxnSpPr>
-                <p:cNvPr id="448" name="Rett linje 447">
-                  <a:extLst>
-                    <a:ext uri="{FF2B5EF4-FFF2-40B4-BE49-F238E27FC236}">
-                      <a16:creationId xmlns:a16="http://schemas.microsoft.com/office/drawing/2014/main" id="{A2803FA3-26AB-496C-BDA6-4272B508568C}"/>
-                    </a:ext>
-                  </a:extLst>
-                </p:cNvPr>
-                <p:cNvCxnSpPr/>
-                <p:nvPr/>
-              </p:nvCxnSpPr>
-              <p:spPr>
-                <a:xfrm flipH="1">
-                  <a:off x="10428726" y="3705270"/>
-                  <a:ext cx="245021" cy="245021"/>
-                </a:xfrm>
-                <a:prstGeom prst="line">
-                  <a:avLst/>
-                </a:prstGeom>
-              </p:spPr>
-              <p:style>
-                <a:lnRef idx="1">
-                  <a:schemeClr val="accent1"/>
-                </a:lnRef>
-                <a:fillRef idx="0">
-                  <a:schemeClr val="accent1"/>
-                </a:fillRef>
-                <a:effectRef idx="0">
-                  <a:schemeClr val="accent1"/>
-                </a:effectRef>
-                <a:fontRef idx="minor">
-                  <a:schemeClr val="tx1"/>
-                </a:fontRef>
-              </p:style>
-            </p:cxnSp>
-          </p:grpSp>
-          <p:cxnSp>
-            <p:nvCxnSpPr>
-              <p:cNvPr id="444" name="Rett linje 443">
-                <a:extLst>
-                  <a:ext uri="{FF2B5EF4-FFF2-40B4-BE49-F238E27FC236}">
-                    <a16:creationId xmlns:a16="http://schemas.microsoft.com/office/drawing/2014/main" id="{32245EAA-F36B-4556-BF65-AD8C0BE4A06D}"/>
-                  </a:ext>
-                </a:extLst>
-              </p:cNvPr>
-              <p:cNvCxnSpPr>
-                <a:cxnSpLocks/>
-              </p:cNvCxnSpPr>
-              <p:nvPr/>
-            </p:nvCxnSpPr>
-            <p:spPr>
-              <a:xfrm rot="5400000" flipV="1">
-                <a:off x="9322761" y="3824631"/>
-                <a:ext cx="245021" cy="245021"/>
-              </a:xfrm>
-              <a:prstGeom prst="line">
-                <a:avLst/>
-              </a:prstGeom>
-            </p:spPr>
-            <p:style>
-              <a:lnRef idx="1">
-                <a:schemeClr val="accent1"/>
-              </a:lnRef>
-              <a:fillRef idx="0">
-                <a:schemeClr val="accent1"/>
-              </a:fillRef>
-              <a:effectRef idx="0">
-                <a:schemeClr val="accent1"/>
-              </a:effectRef>
-              <a:fontRef idx="minor">
-                <a:schemeClr val="tx1"/>
-              </a:fontRef>
-            </p:style>
-          </p:cxnSp>
-          <p:cxnSp>
-            <p:nvCxnSpPr>
-              <p:cNvPr id="445" name="Rett linje 444">
-                <a:extLst>
-                  <a:ext uri="{FF2B5EF4-FFF2-40B4-BE49-F238E27FC236}">
-                    <a16:creationId xmlns:a16="http://schemas.microsoft.com/office/drawing/2014/main" id="{20B3F1D6-EEB8-4B68-9127-0FCAF4C246B1}"/>
-                  </a:ext>
-                </a:extLst>
-              </p:cNvPr>
-              <p:cNvCxnSpPr>
-                <a:cxnSpLocks/>
-              </p:cNvCxnSpPr>
-              <p:nvPr/>
-            </p:nvCxnSpPr>
-            <p:spPr>
-              <a:xfrm rot="5400000" flipV="1">
-                <a:off x="9077060" y="3579958"/>
-                <a:ext cx="245021" cy="245021"/>
-              </a:xfrm>
-              <a:prstGeom prst="line">
-                <a:avLst/>
-              </a:prstGeom>
-            </p:spPr>
-            <p:style>
-              <a:lnRef idx="1">
-                <a:schemeClr val="accent1"/>
-              </a:lnRef>
-              <a:fillRef idx="0">
-                <a:schemeClr val="accent1"/>
-              </a:fillRef>
-              <a:effectRef idx="0">
-                <a:schemeClr val="accent1"/>
-              </a:effectRef>
-              <a:fontRef idx="minor">
-                <a:schemeClr val="tx1"/>
-              </a:fontRef>
-            </p:style>
-          </p:cxnSp>
-          <p:cxnSp>
-            <p:nvCxnSpPr>
-              <p:cNvPr id="446" name="Rett linje 445">
-                <a:extLst>
-                  <a:ext uri="{FF2B5EF4-FFF2-40B4-BE49-F238E27FC236}">
-                    <a16:creationId xmlns:a16="http://schemas.microsoft.com/office/drawing/2014/main" id="{2D04A9C4-2386-4293-A0FD-37BB14A07D8B}"/>
-                  </a:ext>
-                </a:extLst>
-              </p:cNvPr>
-              <p:cNvCxnSpPr>
-                <a:cxnSpLocks/>
-              </p:cNvCxnSpPr>
-              <p:nvPr/>
-            </p:nvCxnSpPr>
-            <p:spPr>
-              <a:xfrm rot="5400000">
-                <a:off x="8835366" y="3579959"/>
-                <a:ext cx="245021" cy="245021"/>
-              </a:xfrm>
-              <a:prstGeom prst="line">
-                <a:avLst/>
-              </a:prstGeom>
-            </p:spPr>
-            <p:style>
-              <a:lnRef idx="1">
-                <a:schemeClr val="accent1"/>
-              </a:lnRef>
-              <a:fillRef idx="0">
-                <a:schemeClr val="accent1"/>
-              </a:fillRef>
-              <a:effectRef idx="0">
-                <a:schemeClr val="accent1"/>
-              </a:effectRef>
-              <a:fontRef idx="minor">
-                <a:schemeClr val="tx1"/>
-              </a:fontRef>
-            </p:style>
-          </p:cxnSp>
-        </p:grpSp>
-      </p:grpSp>
-      <p:grpSp>
-        <p:nvGrpSpPr>
-          <p:cNvPr id="457" name="Gruppe 456">
-            <a:extLst>
-              <a:ext uri="{FF2B5EF4-FFF2-40B4-BE49-F238E27FC236}">
-                <a16:creationId xmlns:a16="http://schemas.microsoft.com/office/drawing/2014/main" id="{002A2DAA-0DF2-41B3-8E65-4E8FAFD0AFA7}"/>
-              </a:ext>
-            </a:extLst>
-          </p:cNvPr>
-          <p:cNvGrpSpPr/>
-          <p:nvPr/>
-        </p:nvGrpSpPr>
-        <p:grpSpPr>
-          <a:xfrm>
-            <a:off x="7743786" y="2487319"/>
-            <a:ext cx="547892" cy="271468"/>
-            <a:chOff x="7580554" y="2222768"/>
-            <a:chExt cx="547892" cy="271468"/>
-          </a:xfrm>
-        </p:grpSpPr>
-        <p:sp>
-          <p:nvSpPr>
-            <p:cNvPr id="458" name="TekstSylinder 457">
-              <a:extLst>
-                <a:ext uri="{FF2B5EF4-FFF2-40B4-BE49-F238E27FC236}">
-                  <a16:creationId xmlns:a16="http://schemas.microsoft.com/office/drawing/2014/main" id="{AE855CCD-3AF3-4099-A808-F066E7B9A53A}"/>
-                </a:ext>
-              </a:extLst>
-            </p:cNvPr>
-            <p:cNvSpPr txBox="1"/>
-            <p:nvPr/>
-          </p:nvSpPr>
-          <p:spPr>
-            <a:xfrm>
-              <a:off x="7623497" y="2222768"/>
-              <a:ext cx="468398" cy="246221"/>
-            </a:xfrm>
-            <a:prstGeom prst="rect">
-              <a:avLst/>
-            </a:prstGeom>
-            <a:noFill/>
-          </p:spPr>
-          <p:txBody>
-            <a:bodyPr wrap="none" rtlCol="0">
-              <a:spAutoFit/>
-            </a:bodyPr>
-            <a:lstStyle/>
-            <a:p>
-              <a:r>
-                <a:rPr lang="nb-NO" sz="1000" dirty="0"/>
-                <a:t>10K</a:t>
-              </a:r>
-              <a:r>
-                <a:rPr lang="el-GR" sz="1000" dirty="0"/>
-                <a:t>Ω</a:t>
-              </a:r>
-              <a:endParaRPr lang="nb-NO" sz="1000" dirty="0"/>
-            </a:p>
-          </p:txBody>
-        </p:sp>
-        <p:grpSp>
-          <p:nvGrpSpPr>
-            <p:cNvPr id="459" name="Gruppe 458">
-              <a:extLst>
-                <a:ext uri="{FF2B5EF4-FFF2-40B4-BE49-F238E27FC236}">
-                  <a16:creationId xmlns:a16="http://schemas.microsoft.com/office/drawing/2014/main" id="{5BFEF427-BF1E-4546-8E02-2AAD85F03354}"/>
-                </a:ext>
-              </a:extLst>
-            </p:cNvPr>
-            <p:cNvGrpSpPr/>
-            <p:nvPr/>
-          </p:nvGrpSpPr>
-          <p:grpSpPr>
-            <a:xfrm>
-              <a:off x="7580554" y="2411500"/>
-              <a:ext cx="547892" cy="82736"/>
-              <a:chOff x="8835366" y="3579958"/>
-              <a:chExt cx="2941057" cy="495156"/>
-            </a:xfrm>
-          </p:grpSpPr>
-          <p:cxnSp>
-            <p:nvCxnSpPr>
-              <p:cNvPr id="460" name="Rett linje 459">
-                <a:extLst>
-                  <a:ext uri="{FF2B5EF4-FFF2-40B4-BE49-F238E27FC236}">
-                    <a16:creationId xmlns:a16="http://schemas.microsoft.com/office/drawing/2014/main" id="{35318E0C-C016-4201-B7E3-D7F9EA3874AD}"/>
-                  </a:ext>
-                </a:extLst>
-              </p:cNvPr>
-              <p:cNvCxnSpPr>
-                <a:cxnSpLocks/>
-              </p:cNvCxnSpPr>
-              <p:nvPr/>
-            </p:nvCxnSpPr>
-            <p:spPr>
-              <a:xfrm rot="5400000">
-                <a:off x="11531402" y="3824631"/>
-                <a:ext cx="245021" cy="245021"/>
-              </a:xfrm>
-              <a:prstGeom prst="line">
-                <a:avLst/>
-              </a:prstGeom>
-            </p:spPr>
-            <p:style>
-              <a:lnRef idx="1">
-                <a:schemeClr val="accent1"/>
-              </a:lnRef>
-              <a:fillRef idx="0">
-                <a:schemeClr val="accent1"/>
-              </a:fillRef>
-              <a:effectRef idx="0">
-                <a:schemeClr val="accent1"/>
-              </a:effectRef>
-              <a:fontRef idx="minor">
-                <a:schemeClr val="tx1"/>
-              </a:fontRef>
-            </p:style>
-          </p:cxnSp>
-          <p:grpSp>
-            <p:nvGrpSpPr>
-              <p:cNvPr id="461" name="Gruppe 460">
-                <a:extLst>
-                  <a:ext uri="{FF2B5EF4-FFF2-40B4-BE49-F238E27FC236}">
-                    <a16:creationId xmlns:a16="http://schemas.microsoft.com/office/drawing/2014/main" id="{F60A68DE-99D2-4EA8-BF43-8CA0C95C54FD}"/>
-                  </a:ext>
-                </a:extLst>
-              </p:cNvPr>
-              <p:cNvGrpSpPr/>
-              <p:nvPr/>
-            </p:nvGrpSpPr>
-            <p:grpSpPr>
-              <a:xfrm rot="5400000" flipH="1">
-                <a:off x="11037517" y="3579947"/>
-                <a:ext cx="489693" cy="489717"/>
-                <a:chOff x="10429077" y="2971507"/>
-                <a:chExt cx="489693" cy="489717"/>
-              </a:xfrm>
-            </p:grpSpPr>
-            <p:cxnSp>
-              <p:nvCxnSpPr>
-                <p:cNvPr id="474" name="Rett linje 473">
-                  <a:extLst>
-                    <a:ext uri="{FF2B5EF4-FFF2-40B4-BE49-F238E27FC236}">
-                      <a16:creationId xmlns:a16="http://schemas.microsoft.com/office/drawing/2014/main" id="{10B58B12-3D54-4015-8E07-A25C1B5A64CA}"/>
-                    </a:ext>
-                  </a:extLst>
-                </p:cNvPr>
-                <p:cNvCxnSpPr>
-                  <a:cxnSpLocks/>
-                </p:cNvCxnSpPr>
-                <p:nvPr/>
-              </p:nvCxnSpPr>
-              <p:spPr>
-                <a:xfrm flipH="1" flipV="1">
-                  <a:off x="10429077" y="2971507"/>
-                  <a:ext cx="245021" cy="245021"/>
-                </a:xfrm>
-                <a:prstGeom prst="line">
-                  <a:avLst/>
-                </a:prstGeom>
-              </p:spPr>
-              <p:style>
-                <a:lnRef idx="1">
-                  <a:schemeClr val="accent1"/>
-                </a:lnRef>
-                <a:fillRef idx="0">
-                  <a:schemeClr val="accent1"/>
-                </a:fillRef>
-                <a:effectRef idx="0">
-                  <a:schemeClr val="accent1"/>
-                </a:effectRef>
-                <a:fontRef idx="minor">
-                  <a:schemeClr val="tx1"/>
-                </a:fontRef>
-              </p:style>
-            </p:cxnSp>
-            <p:cxnSp>
-              <p:nvCxnSpPr>
-                <p:cNvPr id="475" name="Rett linje 474">
-                  <a:extLst>
-                    <a:ext uri="{FF2B5EF4-FFF2-40B4-BE49-F238E27FC236}">
-                      <a16:creationId xmlns:a16="http://schemas.microsoft.com/office/drawing/2014/main" id="{EABD78B1-C7F3-4355-BC91-EC392443C397}"/>
-                    </a:ext>
-                  </a:extLst>
-                </p:cNvPr>
-                <p:cNvCxnSpPr>
-                  <a:cxnSpLocks/>
-                </p:cNvCxnSpPr>
-                <p:nvPr/>
-              </p:nvCxnSpPr>
-              <p:spPr>
-                <a:xfrm flipH="1" flipV="1">
-                  <a:off x="10673749" y="3216203"/>
-                  <a:ext cx="245021" cy="245021"/>
-                </a:xfrm>
-                <a:prstGeom prst="line">
-                  <a:avLst/>
-                </a:prstGeom>
-              </p:spPr>
-              <p:style>
-                <a:lnRef idx="1">
-                  <a:schemeClr val="accent1"/>
-                </a:lnRef>
-                <a:fillRef idx="0">
-                  <a:schemeClr val="accent1"/>
-                </a:fillRef>
-                <a:effectRef idx="0">
-                  <a:schemeClr val="accent1"/>
-                </a:effectRef>
-                <a:fontRef idx="minor">
-                  <a:schemeClr val="tx1"/>
-                </a:fontRef>
-              </p:style>
-            </p:cxnSp>
-          </p:grpSp>
-          <p:grpSp>
-            <p:nvGrpSpPr>
-              <p:cNvPr id="462" name="Gruppe 461">
-                <a:extLst>
-                  <a:ext uri="{FF2B5EF4-FFF2-40B4-BE49-F238E27FC236}">
-                    <a16:creationId xmlns:a16="http://schemas.microsoft.com/office/drawing/2014/main" id="{113A5CE4-C950-4AD9-BD56-EC5A0D7C2B74}"/>
-                  </a:ext>
-                </a:extLst>
-              </p:cNvPr>
-              <p:cNvGrpSpPr/>
-              <p:nvPr/>
-            </p:nvGrpSpPr>
-            <p:grpSpPr>
-              <a:xfrm rot="5400000" flipH="1">
-                <a:off x="10546105" y="3582658"/>
-                <a:ext cx="490043" cy="489392"/>
-                <a:chOff x="10428726" y="3460899"/>
-                <a:chExt cx="490043" cy="489392"/>
-              </a:xfrm>
-            </p:grpSpPr>
-            <p:cxnSp>
-              <p:nvCxnSpPr>
-                <p:cNvPr id="472" name="Rett linje 471">
-                  <a:extLst>
-                    <a:ext uri="{FF2B5EF4-FFF2-40B4-BE49-F238E27FC236}">
-                      <a16:creationId xmlns:a16="http://schemas.microsoft.com/office/drawing/2014/main" id="{B790950E-0C22-44DA-9D09-A6789527FCF7}"/>
-                    </a:ext>
-                  </a:extLst>
-                </p:cNvPr>
-                <p:cNvCxnSpPr/>
-                <p:nvPr/>
-              </p:nvCxnSpPr>
-              <p:spPr>
-                <a:xfrm flipH="1">
-                  <a:off x="10673748" y="3460899"/>
-                  <a:ext cx="245021" cy="245021"/>
-                </a:xfrm>
-                <a:prstGeom prst="line">
-                  <a:avLst/>
-                </a:prstGeom>
-              </p:spPr>
-              <p:style>
-                <a:lnRef idx="1">
-                  <a:schemeClr val="accent1"/>
-                </a:lnRef>
-                <a:fillRef idx="0">
-                  <a:schemeClr val="accent1"/>
-                </a:fillRef>
-                <a:effectRef idx="0">
-                  <a:schemeClr val="accent1"/>
-                </a:effectRef>
-                <a:fontRef idx="minor">
-                  <a:schemeClr val="tx1"/>
-                </a:fontRef>
-              </p:style>
-            </p:cxnSp>
-            <p:cxnSp>
-              <p:nvCxnSpPr>
-                <p:cNvPr id="473" name="Rett linje 472">
-                  <a:extLst>
-                    <a:ext uri="{FF2B5EF4-FFF2-40B4-BE49-F238E27FC236}">
-                      <a16:creationId xmlns:a16="http://schemas.microsoft.com/office/drawing/2014/main" id="{A1B801B5-C72A-4659-91F5-3E893D7B0667}"/>
-                    </a:ext>
-                  </a:extLst>
-                </p:cNvPr>
-                <p:cNvCxnSpPr/>
-                <p:nvPr/>
-              </p:nvCxnSpPr>
-              <p:spPr>
-                <a:xfrm flipH="1">
-                  <a:off x="10428726" y="3705270"/>
-                  <a:ext cx="245021" cy="245021"/>
-                </a:xfrm>
-                <a:prstGeom prst="line">
-                  <a:avLst/>
-                </a:prstGeom>
-              </p:spPr>
-              <p:style>
-                <a:lnRef idx="1">
-                  <a:schemeClr val="accent1"/>
-                </a:lnRef>
-                <a:fillRef idx="0">
-                  <a:schemeClr val="accent1"/>
-                </a:fillRef>
-                <a:effectRef idx="0">
-                  <a:schemeClr val="accent1"/>
-                </a:effectRef>
-                <a:fontRef idx="minor">
-                  <a:schemeClr val="tx1"/>
-                </a:fontRef>
-              </p:style>
-            </p:cxnSp>
-          </p:grpSp>
-          <p:grpSp>
-            <p:nvGrpSpPr>
-              <p:cNvPr id="463" name="Gruppe 462">
-                <a:extLst>
-                  <a:ext uri="{FF2B5EF4-FFF2-40B4-BE49-F238E27FC236}">
-                    <a16:creationId xmlns:a16="http://schemas.microsoft.com/office/drawing/2014/main" id="{2998FA87-F83D-4E0C-817E-E12B0427E280}"/>
-                  </a:ext>
-                </a:extLst>
-              </p:cNvPr>
-              <p:cNvGrpSpPr/>
-              <p:nvPr/>
-            </p:nvGrpSpPr>
-            <p:grpSpPr>
-              <a:xfrm rot="5400000" flipH="1">
-                <a:off x="10054716" y="3580298"/>
-                <a:ext cx="489693" cy="489717"/>
-                <a:chOff x="10429077" y="2971507"/>
-                <a:chExt cx="489693" cy="489717"/>
-              </a:xfrm>
-            </p:grpSpPr>
-            <p:cxnSp>
-              <p:nvCxnSpPr>
-                <p:cNvPr id="470" name="Rett linje 469">
-                  <a:extLst>
-                    <a:ext uri="{FF2B5EF4-FFF2-40B4-BE49-F238E27FC236}">
-                      <a16:creationId xmlns:a16="http://schemas.microsoft.com/office/drawing/2014/main" id="{095CE18A-6AD6-417F-A243-0B2AC33307B9}"/>
-                    </a:ext>
-                  </a:extLst>
-                </p:cNvPr>
-                <p:cNvCxnSpPr>
-                  <a:cxnSpLocks/>
-                </p:cNvCxnSpPr>
-                <p:nvPr/>
-              </p:nvCxnSpPr>
-              <p:spPr>
-                <a:xfrm flipH="1" flipV="1">
-                  <a:off x="10429077" y="2971507"/>
-                  <a:ext cx="245021" cy="245021"/>
-                </a:xfrm>
-                <a:prstGeom prst="line">
-                  <a:avLst/>
-                </a:prstGeom>
-              </p:spPr>
-              <p:style>
-                <a:lnRef idx="1">
-                  <a:schemeClr val="accent1"/>
-                </a:lnRef>
-                <a:fillRef idx="0">
-                  <a:schemeClr val="accent1"/>
-                </a:fillRef>
-                <a:effectRef idx="0">
-                  <a:schemeClr val="accent1"/>
-                </a:effectRef>
-                <a:fontRef idx="minor">
-                  <a:schemeClr val="tx1"/>
-                </a:fontRef>
-              </p:style>
-            </p:cxnSp>
-            <p:cxnSp>
-              <p:nvCxnSpPr>
-                <p:cNvPr id="471" name="Rett linje 470">
-                  <a:extLst>
-                    <a:ext uri="{FF2B5EF4-FFF2-40B4-BE49-F238E27FC236}">
-                      <a16:creationId xmlns:a16="http://schemas.microsoft.com/office/drawing/2014/main" id="{A167EB06-1E50-43DE-B779-5E137E7BE5F9}"/>
-                    </a:ext>
-                  </a:extLst>
-                </p:cNvPr>
-                <p:cNvCxnSpPr>
-                  <a:cxnSpLocks/>
-                </p:cNvCxnSpPr>
-                <p:nvPr/>
-              </p:nvCxnSpPr>
-              <p:spPr>
-                <a:xfrm flipH="1" flipV="1">
-                  <a:off x="10673749" y="3216203"/>
-                  <a:ext cx="245021" cy="245021"/>
-                </a:xfrm>
-                <a:prstGeom prst="line">
-                  <a:avLst/>
-                </a:prstGeom>
-              </p:spPr>
-              <p:style>
-                <a:lnRef idx="1">
-                  <a:schemeClr val="accent1"/>
-                </a:lnRef>
-                <a:fillRef idx="0">
-                  <a:schemeClr val="accent1"/>
-                </a:fillRef>
-                <a:effectRef idx="0">
-                  <a:schemeClr val="accent1"/>
-                </a:effectRef>
-                <a:fontRef idx="minor">
-                  <a:schemeClr val="tx1"/>
-                </a:fontRef>
-              </p:style>
-            </p:cxnSp>
-          </p:grpSp>
-          <p:grpSp>
-            <p:nvGrpSpPr>
-              <p:cNvPr id="464" name="Gruppe 463">
-                <a:extLst>
-                  <a:ext uri="{FF2B5EF4-FFF2-40B4-BE49-F238E27FC236}">
-                    <a16:creationId xmlns:a16="http://schemas.microsoft.com/office/drawing/2014/main" id="{1E7B641B-2BEC-4AE6-8800-0A706ADA0D8F}"/>
-                  </a:ext>
-                </a:extLst>
-              </p:cNvPr>
-              <p:cNvGrpSpPr/>
-              <p:nvPr/>
-            </p:nvGrpSpPr>
-            <p:grpSpPr>
-              <a:xfrm rot="5400000" flipH="1">
-                <a:off x="9565637" y="3585397"/>
-                <a:ext cx="490043" cy="489392"/>
-                <a:chOff x="10428726" y="3460899"/>
-                <a:chExt cx="490043" cy="489392"/>
-              </a:xfrm>
-            </p:grpSpPr>
-            <p:cxnSp>
-              <p:nvCxnSpPr>
-                <p:cNvPr id="468" name="Rett linje 467">
-                  <a:extLst>
-                    <a:ext uri="{FF2B5EF4-FFF2-40B4-BE49-F238E27FC236}">
-                      <a16:creationId xmlns:a16="http://schemas.microsoft.com/office/drawing/2014/main" id="{CCB3C9B0-27FD-4652-BC89-A6AB04218D74}"/>
-                    </a:ext>
-                  </a:extLst>
-                </p:cNvPr>
-                <p:cNvCxnSpPr/>
-                <p:nvPr/>
-              </p:nvCxnSpPr>
-              <p:spPr>
-                <a:xfrm flipH="1">
-                  <a:off x="10673748" y="3460899"/>
-                  <a:ext cx="245021" cy="245021"/>
-                </a:xfrm>
-                <a:prstGeom prst="line">
-                  <a:avLst/>
-                </a:prstGeom>
-              </p:spPr>
-              <p:style>
-                <a:lnRef idx="1">
-                  <a:schemeClr val="accent1"/>
-                </a:lnRef>
-                <a:fillRef idx="0">
-                  <a:schemeClr val="accent1"/>
-                </a:fillRef>
-                <a:effectRef idx="0">
-                  <a:schemeClr val="accent1"/>
-                </a:effectRef>
-                <a:fontRef idx="minor">
-                  <a:schemeClr val="tx1"/>
-                </a:fontRef>
-              </p:style>
-            </p:cxnSp>
-            <p:cxnSp>
-              <p:nvCxnSpPr>
-                <p:cNvPr id="469" name="Rett linje 468">
-                  <a:extLst>
-                    <a:ext uri="{FF2B5EF4-FFF2-40B4-BE49-F238E27FC236}">
-                      <a16:creationId xmlns:a16="http://schemas.microsoft.com/office/drawing/2014/main" id="{189F3AFC-8532-4452-929C-35E69C48F4CF}"/>
-                    </a:ext>
-                  </a:extLst>
-                </p:cNvPr>
-                <p:cNvCxnSpPr/>
-                <p:nvPr/>
-              </p:nvCxnSpPr>
-              <p:spPr>
-                <a:xfrm flipH="1">
-                  <a:off x="10428726" y="3705270"/>
-                  <a:ext cx="245021" cy="245021"/>
-                </a:xfrm>
-                <a:prstGeom prst="line">
-                  <a:avLst/>
-                </a:prstGeom>
-              </p:spPr>
-              <p:style>
-                <a:lnRef idx="1">
-                  <a:schemeClr val="accent1"/>
-                </a:lnRef>
-                <a:fillRef idx="0">
-                  <a:schemeClr val="accent1"/>
-                </a:fillRef>
-                <a:effectRef idx="0">
-                  <a:schemeClr val="accent1"/>
-                </a:effectRef>
-                <a:fontRef idx="minor">
-                  <a:schemeClr val="tx1"/>
-                </a:fontRef>
-              </p:style>
-            </p:cxnSp>
-          </p:grpSp>
-          <p:cxnSp>
-            <p:nvCxnSpPr>
-              <p:cNvPr id="465" name="Rett linje 464">
-                <a:extLst>
-                  <a:ext uri="{FF2B5EF4-FFF2-40B4-BE49-F238E27FC236}">
-                    <a16:creationId xmlns:a16="http://schemas.microsoft.com/office/drawing/2014/main" id="{C0E0437A-1E11-4630-9550-C555B1D7C3A2}"/>
-                  </a:ext>
-                </a:extLst>
-              </p:cNvPr>
-              <p:cNvCxnSpPr>
-                <a:cxnSpLocks/>
-              </p:cNvCxnSpPr>
-              <p:nvPr/>
-            </p:nvCxnSpPr>
-            <p:spPr>
-              <a:xfrm rot="5400000" flipV="1">
-                <a:off x="9322761" y="3824631"/>
-                <a:ext cx="245021" cy="245021"/>
-              </a:xfrm>
-              <a:prstGeom prst="line">
-                <a:avLst/>
-              </a:prstGeom>
-            </p:spPr>
-            <p:style>
-              <a:lnRef idx="1">
-                <a:schemeClr val="accent1"/>
-              </a:lnRef>
-              <a:fillRef idx="0">
-                <a:schemeClr val="accent1"/>
-              </a:fillRef>
-              <a:effectRef idx="0">
-                <a:schemeClr val="accent1"/>
-              </a:effectRef>
-              <a:fontRef idx="minor">
-                <a:schemeClr val="tx1"/>
-              </a:fontRef>
-            </p:style>
-          </p:cxnSp>
-          <p:cxnSp>
-            <p:nvCxnSpPr>
-              <p:cNvPr id="466" name="Rett linje 465">
-                <a:extLst>
-                  <a:ext uri="{FF2B5EF4-FFF2-40B4-BE49-F238E27FC236}">
-                    <a16:creationId xmlns:a16="http://schemas.microsoft.com/office/drawing/2014/main" id="{4B745B32-593B-435D-B8F5-360F5BDB1D86}"/>
-                  </a:ext>
-                </a:extLst>
-              </p:cNvPr>
-              <p:cNvCxnSpPr>
-                <a:cxnSpLocks/>
-              </p:cNvCxnSpPr>
-              <p:nvPr/>
-            </p:nvCxnSpPr>
-            <p:spPr>
-              <a:xfrm rot="5400000" flipV="1">
-                <a:off x="9077060" y="3579958"/>
-                <a:ext cx="245021" cy="245021"/>
-              </a:xfrm>
-              <a:prstGeom prst="line">
-                <a:avLst/>
-              </a:prstGeom>
-            </p:spPr>
-            <p:style>
-              <a:lnRef idx="1">
-                <a:schemeClr val="accent1"/>
-              </a:lnRef>
-              <a:fillRef idx="0">
-                <a:schemeClr val="accent1"/>
-              </a:fillRef>
-              <a:effectRef idx="0">
-                <a:schemeClr val="accent1"/>
-              </a:effectRef>
-              <a:fontRef idx="minor">
-                <a:schemeClr val="tx1"/>
-              </a:fontRef>
-            </p:style>
-          </p:cxnSp>
-          <p:cxnSp>
-            <p:nvCxnSpPr>
-              <p:cNvPr id="467" name="Rett linje 466">
-                <a:extLst>
-                  <a:ext uri="{FF2B5EF4-FFF2-40B4-BE49-F238E27FC236}">
-                    <a16:creationId xmlns:a16="http://schemas.microsoft.com/office/drawing/2014/main" id="{865239D7-FBDC-4FD4-8723-77AEA952EA16}"/>
-                  </a:ext>
-                </a:extLst>
-              </p:cNvPr>
-              <p:cNvCxnSpPr>
-                <a:cxnSpLocks/>
-              </p:cNvCxnSpPr>
-              <p:nvPr/>
-            </p:nvCxnSpPr>
-            <p:spPr>
-              <a:xfrm rot="5400000">
-                <a:off x="8835366" y="3579959"/>
-                <a:ext cx="245021" cy="245021"/>
-              </a:xfrm>
-              <a:prstGeom prst="line">
-                <a:avLst/>
-              </a:prstGeom>
-            </p:spPr>
-            <p:style>
-              <a:lnRef idx="1">
-                <a:schemeClr val="accent1"/>
-              </a:lnRef>
-              <a:fillRef idx="0">
-                <a:schemeClr val="accent1"/>
-              </a:fillRef>
-              <a:effectRef idx="0">
-                <a:schemeClr val="accent1"/>
-              </a:effectRef>
-              <a:fontRef idx="minor">
-                <a:schemeClr val="tx1"/>
-              </a:fontRef>
-            </p:style>
-          </p:cxnSp>
-        </p:grpSp>
-      </p:grpSp>
       <p:cxnSp>
         <p:nvCxnSpPr>
           <p:cNvPr id="480" name="Rett linje 479">
@@ -36652,45 +34851,7 @@
         <p:spPr>
           <a:xfrm>
             <a:off x="7218502" y="2712299"/>
-            <a:ext cx="525284" cy="0"/>
-          </a:xfrm>
-          <a:prstGeom prst="line">
-            <a:avLst/>
-          </a:prstGeom>
-        </p:spPr>
-        <p:style>
-          <a:lnRef idx="1">
-            <a:schemeClr val="accent1"/>
-          </a:lnRef>
-          <a:fillRef idx="0">
-            <a:schemeClr val="accent1"/>
-          </a:fillRef>
-          <a:effectRef idx="0">
-            <a:schemeClr val="accent1"/>
-          </a:effectRef>
-          <a:fontRef idx="minor">
-            <a:schemeClr val="tx1"/>
-          </a:fontRef>
-        </p:style>
-      </p:cxnSp>
-      <p:cxnSp>
-        <p:nvCxnSpPr>
-          <p:cNvPr id="484" name="Rett linje 483">
-            <a:extLst>
-              <a:ext uri="{FF2B5EF4-FFF2-40B4-BE49-F238E27FC236}">
-                <a16:creationId xmlns:a16="http://schemas.microsoft.com/office/drawing/2014/main" id="{F9C7F262-B21F-421A-8CFC-13115E363C22}"/>
-              </a:ext>
-            </a:extLst>
-          </p:cNvPr>
-          <p:cNvCxnSpPr>
-            <a:cxnSpLocks/>
-          </p:cNvCxnSpPr>
-          <p:nvPr/>
-        </p:nvCxnSpPr>
-        <p:spPr>
-          <a:xfrm>
-            <a:off x="8285597" y="2452942"/>
-            <a:ext cx="1037232" cy="0"/>
+            <a:ext cx="2302695" cy="0"/>
           </a:xfrm>
           <a:prstGeom prst="line">
             <a:avLst/>

</xml_diff>